<commit_message>
✨| Minor visual changes
</commit_message>
<xml_diff>
--- a/climate_change.pptx
+++ b/climate_change.pptx
@@ -2668,7 +2668,15 @@
           <a:p>
             <a:r>
               <a:rPr lang="en-US" b="1" dirty="0"/>
-              <a:t>2 Which countries/ territories emit the most?</a:t>
+              <a:t>2 </a:t>
+            </a:r>
+            <a:r>
+              <a:rPr lang="en-US" b="1"/>
+              <a:t>Which continents emit </a:t>
+            </a:r>
+            <a:r>
+              <a:rPr lang="en-US" b="1" dirty="0"/>
+              <a:t>the most?</a:t>
             </a:r>
             <a:endParaRPr lang="en-US" dirty="0"/>
           </a:p>
@@ -2976,6 +2984,14 @@
             <a:r>
               <a:rPr lang="sk-SK" dirty="0" err="1"/>
               <a:t>the</a:t>
+            </a:r>
+            <a:r>
+              <a:rPr lang="sk-SK" dirty="0"/>
+              <a:t> </a:t>
+            </a:r>
+            <a:r>
+              <a:rPr lang="sk-SK" dirty="0" err="1"/>
+              <a:t>climate</a:t>
             </a:r>
             <a:r>
               <a:rPr lang="sk-SK" dirty="0"/>
@@ -3768,7 +3784,7 @@
             </a:r>
             <a:r>
               <a:rPr lang="sk-SK" dirty="0" err="1"/>
-              <a:t>countries</a:t>
+              <a:t>continents</a:t>
             </a:r>
             <a:r>
               <a:rPr lang="sk-SK" dirty="0"/>

</xml_diff>